<commit_message>
Update 05.First Law of Thermodynamics.pptx
</commit_message>
<xml_diff>
--- a/05.First Law of Thermodynamics.pptx
+++ b/05.First Law of Thermodynamics.pptx
@@ -5,7 +5,7 @@
     <p:sldMasterId id="2147483660" r:id="rId1"/>
   </p:sldMasterIdLst>
   <p:notesMasterIdLst>
-    <p:notesMasterId r:id="rId44"/>
+    <p:notesMasterId r:id="rId43"/>
   </p:notesMasterIdLst>
   <p:sldIdLst>
     <p:sldId id="256" r:id="rId2"/>
@@ -39,17 +39,16 @@
     <p:sldId id="347" r:id="rId30"/>
     <p:sldId id="348" r:id="rId31"/>
     <p:sldId id="349" r:id="rId32"/>
-    <p:sldId id="351" r:id="rId33"/>
-    <p:sldId id="299" r:id="rId34"/>
-    <p:sldId id="298" r:id="rId35"/>
-    <p:sldId id="297" r:id="rId36"/>
-    <p:sldId id="296" r:id="rId37"/>
-    <p:sldId id="305" r:id="rId38"/>
-    <p:sldId id="304" r:id="rId39"/>
-    <p:sldId id="338" r:id="rId40"/>
-    <p:sldId id="303" r:id="rId41"/>
-    <p:sldId id="302" r:id="rId42"/>
-    <p:sldId id="289" r:id="rId43"/>
+    <p:sldId id="299" r:id="rId33"/>
+    <p:sldId id="298" r:id="rId34"/>
+    <p:sldId id="297" r:id="rId35"/>
+    <p:sldId id="296" r:id="rId36"/>
+    <p:sldId id="305" r:id="rId37"/>
+    <p:sldId id="304" r:id="rId38"/>
+    <p:sldId id="338" r:id="rId39"/>
+    <p:sldId id="303" r:id="rId40"/>
+    <p:sldId id="302" r:id="rId41"/>
+    <p:sldId id="289" r:id="rId42"/>
   </p:sldIdLst>
   <p:sldSz cx="9144000" cy="6858000" type="screen4x3"/>
   <p:notesSz cx="6858000" cy="9144000"/>
@@ -4879,8 +4878,8 @@
         </p:nvSpPr>
         <p:spPr>
           <a:xfrm>
-            <a:off x="3947098" y="3116818"/>
-            <a:ext cx="1326004" cy="369332"/>
+            <a:off x="3959923" y="3116818"/>
+            <a:ext cx="1300356" cy="369332"/>
           </a:xfrm>
           <a:prstGeom prst="rect">
             <a:avLst/>
@@ -4906,7 +4905,7 @@
                 </a:solidFill>
                 <a:hlinkClick r:id="rId2"/>
               </a:rPr>
-              <a:t>Example 1</a:t>
+              <a:t>Solution 1</a:t>
             </a:r>
             <a:endParaRPr lang="en-US" b="1" dirty="0">
               <a:solidFill>
@@ -9917,8 +9916,8 @@
         </p:nvSpPr>
         <p:spPr>
           <a:xfrm>
-            <a:off x="3908998" y="5257800"/>
-            <a:ext cx="1326004" cy="369332"/>
+            <a:off x="3921823" y="5257800"/>
+            <a:ext cx="1300356" cy="369332"/>
           </a:xfrm>
           <a:prstGeom prst="rect">
             <a:avLst/>
@@ -9944,7 +9943,7 @@
                 </a:solidFill>
                 <a:hlinkClick r:id="rId3"/>
               </a:rPr>
-              <a:t>Example 2</a:t>
+              <a:t>Solution 2</a:t>
             </a:r>
             <a:endParaRPr lang="en-US" b="1" dirty="0">
               <a:solidFill>
@@ -13087,618 +13086,6 @@
           <a:chExt cx="0" cy="0"/>
         </a:xfrm>
       </p:grpSpPr>
-      <mc:AlternateContent xmlns:mc="http://schemas.openxmlformats.org/markup-compatibility/2006" xmlns:a14="http://schemas.microsoft.com/office/drawing/2010/main">
-        <mc:Choice Requires="a14">
-          <p:sp>
-            <p:nvSpPr>
-              <p:cNvPr id="2" name="Title 1"/>
-              <p:cNvSpPr>
-                <a:spLocks noGrp="1"/>
-              </p:cNvSpPr>
-              <p:nvPr>
-                <p:ph type="title"/>
-              </p:nvPr>
-            </p:nvSpPr>
-            <p:spPr>
-              <a:xfrm>
-                <a:off x="266700" y="427037"/>
-                <a:ext cx="8610600" cy="6153991"/>
-              </a:xfrm>
-            </p:spPr>
-            <p:txBody>
-              <a:bodyPr anchor="t"/>
-              <a:lstStyle/>
-              <a:p>
-                <a:pPr algn="l"/>
-                <a:r>
-                  <a:rPr lang="en-US" sz="3600" b="1" dirty="0">
-                    <a:solidFill>
-                      <a:srgbClr val="FF0000"/>
-                    </a:solidFill>
-                  </a:rPr>
-                  <a:t>Example</a:t>
-                </a:r>
-                <a:br>
-                  <a:rPr lang="en-US" dirty="0"/>
-                </a:br>
-                <a:r>
-                  <a:rPr lang="en-US" sz="2000" b="0" dirty="0">
-                    <a:solidFill>
-                      <a:schemeClr val="tx1"/>
-                    </a:solidFill>
-                  </a:rPr>
-                  <a:t>Humans can control their heat production rate and heat loss rate to maintain a nearly constant core temperature under a wide range of environmental conditions. The process is called thermoregulation. From the perspective of calculating heat transfer between a human body and its surroundings, we focus on a layer of skin and fat, with its outer surface exposed to the environment and its inner surface at a temperature slightly less than the core temperature of </a:t>
-                </a:r>
-                <a14:m>
-                  <m:oMath xmlns:m="http://schemas.openxmlformats.org/officeDocument/2006/math">
-                    <m:r>
-                      <a:rPr lang="en-US" sz="2000" b="0" i="1" dirty="0" smtClean="0">
-                        <a:solidFill>
-                          <a:schemeClr val="tx1"/>
-                        </a:solidFill>
-                        <a:latin typeface="Cambria Math" panose="02040503050406030204" pitchFamily="18" charset="0"/>
-                      </a:rPr>
-                      <m:t>308 </m:t>
-                    </m:r>
-                    <m:r>
-                      <a:rPr lang="en-US" sz="2000" b="0" i="1" dirty="0" smtClean="0">
-                        <a:solidFill>
-                          <a:schemeClr val="tx1"/>
-                        </a:solidFill>
-                        <a:latin typeface="Cambria Math" panose="02040503050406030204" pitchFamily="18" charset="0"/>
-                      </a:rPr>
-                      <m:t>𝐾</m:t>
-                    </m:r>
-                  </m:oMath>
-                </a14:m>
-                <a:r>
-                  <a:rPr lang="en-US" sz="2000" b="0" dirty="0">
-                    <a:solidFill>
-                      <a:schemeClr val="tx1"/>
-                    </a:solidFill>
-                  </a:rPr>
-                  <a:t>. Consider a person with a skin/fat layer of thickness of </a:t>
-                </a:r>
-                <a14:m>
-                  <m:oMath xmlns:m="http://schemas.openxmlformats.org/officeDocument/2006/math">
-                    <m:r>
-                      <a:rPr lang="en-US" sz="2000" b="0" i="1" dirty="0" smtClean="0">
-                        <a:solidFill>
-                          <a:schemeClr val="tx1"/>
-                        </a:solidFill>
-                        <a:latin typeface="Cambria Math" panose="02040503050406030204" pitchFamily="18" charset="0"/>
-                      </a:rPr>
-                      <m:t>3 </m:t>
-                    </m:r>
-                    <m:r>
-                      <a:rPr lang="en-US" sz="2000" b="0" i="1" dirty="0" smtClean="0">
-                        <a:solidFill>
-                          <a:schemeClr val="tx1"/>
-                        </a:solidFill>
-                        <a:latin typeface="Cambria Math" panose="02040503050406030204" pitchFamily="18" charset="0"/>
-                      </a:rPr>
-                      <m:t>𝑚𝑚</m:t>
-                    </m:r>
-                    <m:r>
-                      <a:rPr lang="en-US" sz="2000" b="0" i="1" dirty="0" smtClean="0">
-                        <a:solidFill>
-                          <a:schemeClr val="tx1"/>
-                        </a:solidFill>
-                        <a:latin typeface="Cambria Math" panose="02040503050406030204" pitchFamily="18" charset="0"/>
-                      </a:rPr>
-                      <m:t> </m:t>
-                    </m:r>
-                  </m:oMath>
-                </a14:m>
-                <a:r>
-                  <a:rPr lang="en-US" sz="2000" b="0" dirty="0">
-                    <a:solidFill>
-                      <a:schemeClr val="tx1"/>
-                    </a:solidFill>
-                  </a:rPr>
-                  <a:t>and effective thermal conductivity of </a:t>
-                </a:r>
-                <a14:m>
-                  <m:oMath xmlns:m="http://schemas.openxmlformats.org/officeDocument/2006/math">
-                    <m:r>
-                      <a:rPr lang="en-US" sz="2000" b="0" i="1" dirty="0" smtClean="0">
-                        <a:solidFill>
-                          <a:schemeClr val="tx1"/>
-                        </a:solidFill>
-                        <a:latin typeface="Cambria Math" panose="02040503050406030204" pitchFamily="18" charset="0"/>
-                      </a:rPr>
-                      <m:t>0.3 </m:t>
-                    </m:r>
-                    <m:f>
-                      <m:fPr>
-                        <m:ctrlPr>
-                          <a:rPr lang="en-US" sz="2000" b="0" i="1" dirty="0" smtClean="0">
-                            <a:solidFill>
-                              <a:schemeClr val="tx1"/>
-                            </a:solidFill>
-                            <a:latin typeface="Cambria Math" panose="02040503050406030204" pitchFamily="18" charset="0"/>
-                          </a:rPr>
-                        </m:ctrlPr>
-                      </m:fPr>
-                      <m:num>
-                        <m:r>
-                          <a:rPr lang="en-US" sz="2000" b="0" i="1" dirty="0" smtClean="0">
-                            <a:solidFill>
-                              <a:schemeClr val="tx1"/>
-                            </a:solidFill>
-                            <a:latin typeface="Cambria Math" panose="02040503050406030204" pitchFamily="18" charset="0"/>
-                          </a:rPr>
-                          <m:t>𝑊</m:t>
-                        </m:r>
-                      </m:num>
-                      <m:den>
-                        <m:r>
-                          <a:rPr lang="en-US" sz="2000" b="0" i="1" dirty="0" smtClean="0">
-                            <a:solidFill>
-                              <a:schemeClr val="tx1"/>
-                            </a:solidFill>
-                            <a:latin typeface="Cambria Math" panose="02040503050406030204" pitchFamily="18" charset="0"/>
-                          </a:rPr>
-                          <m:t>𝑚</m:t>
-                        </m:r>
-                        <m:r>
-                          <a:rPr lang="en-US" sz="2000" b="0" i="1" dirty="0" smtClean="0">
-                            <a:solidFill>
-                              <a:schemeClr val="tx1"/>
-                            </a:solidFill>
-                            <a:latin typeface="Cambria Math" panose="02040503050406030204" pitchFamily="18" charset="0"/>
-                          </a:rPr>
-                          <m:t> </m:t>
-                        </m:r>
-                        <m:r>
-                          <a:rPr lang="en-US" sz="2000" b="0" i="1" dirty="0" smtClean="0">
-                            <a:solidFill>
-                              <a:schemeClr val="tx1"/>
-                            </a:solidFill>
-                            <a:latin typeface="Cambria Math" panose="02040503050406030204" pitchFamily="18" charset="0"/>
-                          </a:rPr>
-                          <m:t>𝐾</m:t>
-                        </m:r>
-                      </m:den>
-                    </m:f>
-                  </m:oMath>
-                </a14:m>
-                <a:r>
-                  <a:rPr lang="en-US" sz="2000" b="0" dirty="0" err="1">
-                    <a:solidFill>
-                      <a:schemeClr val="tx1"/>
-                    </a:solidFill>
-                  </a:rPr>
-                  <a:t>.</a:t>
-                </a:r>
-                <a:r>
-                  <a:rPr lang="en-US" sz="2000" b="0" dirty="0">
-                    <a:solidFill>
-                      <a:schemeClr val="tx1"/>
-                    </a:solidFill>
-                  </a:rPr>
-                  <a:t> The person has surface area of </a:t>
-                </a:r>
-                <a14:m>
-                  <m:oMath xmlns:m="http://schemas.openxmlformats.org/officeDocument/2006/math">
-                    <m:r>
-                      <a:rPr lang="en-US" sz="2000" b="0" i="1" dirty="0" smtClean="0">
-                        <a:solidFill>
-                          <a:schemeClr val="tx1"/>
-                        </a:solidFill>
-                        <a:latin typeface="Cambria Math" panose="02040503050406030204" pitchFamily="18" charset="0"/>
-                      </a:rPr>
-                      <m:t>1.8 </m:t>
-                    </m:r>
-                    <m:r>
-                      <a:rPr lang="en-US" sz="2000" b="0" i="1" dirty="0" smtClean="0">
-                        <a:solidFill>
-                          <a:schemeClr val="tx1"/>
-                        </a:solidFill>
-                        <a:latin typeface="Cambria Math" panose="02040503050406030204" pitchFamily="18" charset="0"/>
-                      </a:rPr>
-                      <m:t>𝑚</m:t>
-                    </m:r>
-                    <m:r>
-                      <a:rPr lang="en-US" sz="2000" b="0" i="1" baseline="30000" dirty="0">
-                        <a:solidFill>
-                          <a:schemeClr val="tx1"/>
-                        </a:solidFill>
-                        <a:latin typeface="Cambria Math" panose="02040503050406030204" pitchFamily="18" charset="0"/>
-                      </a:rPr>
-                      <m:t>2</m:t>
-                    </m:r>
-                  </m:oMath>
-                </a14:m>
-                <a:r>
-                  <a:rPr lang="en-US" sz="2000" b="0" dirty="0">
-                    <a:solidFill>
-                      <a:schemeClr val="tx1"/>
-                    </a:solidFill>
-                  </a:rPr>
-                  <a:t> and is dressed in a bathing suit. The emissivity of the skin is </a:t>
-                </a:r>
-                <a14:m>
-                  <m:oMath xmlns:m="http://schemas.openxmlformats.org/officeDocument/2006/math">
-                    <m:r>
-                      <a:rPr lang="en-US" sz="2000" b="0" i="1" dirty="0" smtClean="0">
-                        <a:solidFill>
-                          <a:schemeClr val="tx1"/>
-                        </a:solidFill>
-                        <a:latin typeface="Cambria Math" panose="02040503050406030204" pitchFamily="18" charset="0"/>
-                      </a:rPr>
-                      <m:t>0.95</m:t>
-                    </m:r>
-                  </m:oMath>
-                </a14:m>
-                <a:r>
-                  <a:rPr lang="en-US" sz="2000" b="0" dirty="0">
-                    <a:solidFill>
-                      <a:schemeClr val="tx1"/>
-                    </a:solidFill>
-                  </a:rPr>
-                  <a:t>. When the person is in still air at </a:t>
-                </a:r>
-                <a14:m>
-                  <m:oMath xmlns:m="http://schemas.openxmlformats.org/officeDocument/2006/math">
-                    <m:r>
-                      <a:rPr lang="en-US" sz="2000" b="0" i="1" dirty="0" smtClean="0">
-                        <a:solidFill>
-                          <a:schemeClr val="tx1"/>
-                        </a:solidFill>
-                        <a:latin typeface="Cambria Math" panose="02040503050406030204" pitchFamily="18" charset="0"/>
-                      </a:rPr>
-                      <m:t>297 </m:t>
-                    </m:r>
-                    <m:r>
-                      <a:rPr lang="en-US" sz="2000" b="0" i="1" dirty="0" smtClean="0">
-                        <a:solidFill>
-                          <a:schemeClr val="tx1"/>
-                        </a:solidFill>
-                        <a:latin typeface="Cambria Math" panose="02040503050406030204" pitchFamily="18" charset="0"/>
-                      </a:rPr>
-                      <m:t>𝐾</m:t>
-                    </m:r>
-                  </m:oMath>
-                </a14:m>
-                <a:r>
-                  <a:rPr lang="en-US" sz="2000" b="0" dirty="0">
-                    <a:solidFill>
-                      <a:schemeClr val="tx1"/>
-                    </a:solidFill>
-                  </a:rPr>
-                  <a:t>, what is the skin surface temperature and rate of heat loss to the environment? Assume the convection coefficient of the air is </a:t>
-                </a:r>
-                <a14:m>
-                  <m:oMath xmlns:m="http://schemas.openxmlformats.org/officeDocument/2006/math">
-                    <m:r>
-                      <a:rPr lang="en-US" sz="2000" b="0" i="1" dirty="0" smtClean="0">
-                        <a:solidFill>
-                          <a:schemeClr val="tx1"/>
-                        </a:solidFill>
-                        <a:latin typeface="Cambria Math" panose="02040503050406030204" pitchFamily="18" charset="0"/>
-                      </a:rPr>
-                      <m:t>2 </m:t>
-                    </m:r>
-                    <m:f>
-                      <m:fPr>
-                        <m:ctrlPr>
-                          <a:rPr lang="en-US" sz="2000" b="0" i="1" dirty="0" smtClean="0">
-                            <a:solidFill>
-                              <a:schemeClr val="tx1"/>
-                            </a:solidFill>
-                            <a:latin typeface="Cambria Math" panose="02040503050406030204" pitchFamily="18" charset="0"/>
-                          </a:rPr>
-                        </m:ctrlPr>
-                      </m:fPr>
-                      <m:num>
-                        <m:r>
-                          <a:rPr lang="en-US" sz="2000" b="0" i="1" dirty="0" smtClean="0">
-                            <a:solidFill>
-                              <a:schemeClr val="tx1"/>
-                            </a:solidFill>
-                            <a:latin typeface="Cambria Math" panose="02040503050406030204" pitchFamily="18" charset="0"/>
-                          </a:rPr>
-                          <m:t>𝑊</m:t>
-                        </m:r>
-                      </m:num>
-                      <m:den>
-                        <m:sSup>
-                          <m:sSupPr>
-                            <m:ctrlPr>
-                              <a:rPr lang="en-US" sz="2000" b="0" i="1" dirty="0" smtClean="0">
-                                <a:solidFill>
-                                  <a:schemeClr val="tx1"/>
-                                </a:solidFill>
-                                <a:latin typeface="Cambria Math" panose="02040503050406030204" pitchFamily="18" charset="0"/>
-                              </a:rPr>
-                            </m:ctrlPr>
-                          </m:sSupPr>
-                          <m:e>
-                            <m:r>
-                              <a:rPr lang="en-US" sz="2000" b="0" i="1" dirty="0" smtClean="0">
-                                <a:solidFill>
-                                  <a:schemeClr val="tx1"/>
-                                </a:solidFill>
-                                <a:latin typeface="Cambria Math" panose="02040503050406030204" pitchFamily="18" charset="0"/>
-                              </a:rPr>
-                              <m:t>𝑚</m:t>
-                            </m:r>
-                          </m:e>
-                          <m:sup>
-                            <m:r>
-                              <a:rPr lang="en-US" sz="2000" b="0" i="1" dirty="0" smtClean="0">
-                                <a:solidFill>
-                                  <a:schemeClr val="tx1"/>
-                                </a:solidFill>
-                                <a:latin typeface="Cambria Math" panose="02040503050406030204" pitchFamily="18" charset="0"/>
-                              </a:rPr>
-                              <m:t>2</m:t>
-                            </m:r>
-                          </m:sup>
-                        </m:sSup>
-                        <m:r>
-                          <a:rPr lang="en-US" sz="2000" b="0" i="1" dirty="0" smtClean="0">
-                            <a:solidFill>
-                              <a:schemeClr val="tx1"/>
-                            </a:solidFill>
-                            <a:latin typeface="Cambria Math" panose="02040503050406030204" pitchFamily="18" charset="0"/>
-                          </a:rPr>
-                          <m:t>𝐾</m:t>
-                        </m:r>
-                      </m:den>
-                    </m:f>
-                  </m:oMath>
-                </a14:m>
-                <a:r>
-                  <a:rPr lang="en-US" sz="2000" b="0" dirty="0">
-                    <a:solidFill>
-                      <a:schemeClr val="tx1"/>
-                    </a:solidFill>
-                  </a:rPr>
-                  <a:t>. How are the surface temperature and rate of heat loss affected when the person is in water with a convection coefficient of </a:t>
-                </a:r>
-                <a14:m>
-                  <m:oMath xmlns:m="http://schemas.openxmlformats.org/officeDocument/2006/math">
-                    <m:r>
-                      <a:rPr lang="en-US" sz="2000" b="0" i="1" dirty="0" smtClean="0">
-                        <a:solidFill>
-                          <a:schemeClr val="tx1"/>
-                        </a:solidFill>
-                        <a:latin typeface="Cambria Math" panose="02040503050406030204" pitchFamily="18" charset="0"/>
-                      </a:rPr>
-                      <m:t>200 </m:t>
-                    </m:r>
-                    <m:f>
-                      <m:fPr>
-                        <m:ctrlPr>
-                          <a:rPr lang="en-US" sz="2000" b="0" i="1" dirty="0" smtClean="0">
-                            <a:solidFill>
-                              <a:schemeClr val="tx1"/>
-                            </a:solidFill>
-                            <a:latin typeface="Cambria Math" panose="02040503050406030204" pitchFamily="18" charset="0"/>
-                          </a:rPr>
-                        </m:ctrlPr>
-                      </m:fPr>
-                      <m:num>
-                        <m:r>
-                          <a:rPr lang="en-US" sz="2000" b="0" i="1" dirty="0" smtClean="0">
-                            <a:solidFill>
-                              <a:schemeClr val="tx1"/>
-                            </a:solidFill>
-                            <a:latin typeface="Cambria Math" panose="02040503050406030204" pitchFamily="18" charset="0"/>
-                          </a:rPr>
-                          <m:t>𝑊</m:t>
-                        </m:r>
-                      </m:num>
-                      <m:den>
-                        <m:sSup>
-                          <m:sSupPr>
-                            <m:ctrlPr>
-                              <a:rPr lang="en-US" sz="2000" b="0" i="1" dirty="0" smtClean="0">
-                                <a:solidFill>
-                                  <a:schemeClr val="tx1"/>
-                                </a:solidFill>
-                                <a:latin typeface="Cambria Math" panose="02040503050406030204" pitchFamily="18" charset="0"/>
-                              </a:rPr>
-                            </m:ctrlPr>
-                          </m:sSupPr>
-                          <m:e>
-                            <m:r>
-                              <a:rPr lang="en-US" sz="2000" b="0" i="1" dirty="0" smtClean="0">
-                                <a:solidFill>
-                                  <a:schemeClr val="tx1"/>
-                                </a:solidFill>
-                                <a:latin typeface="Cambria Math" panose="02040503050406030204" pitchFamily="18" charset="0"/>
-                              </a:rPr>
-                              <m:t>𝑚</m:t>
-                            </m:r>
-                          </m:e>
-                          <m:sup>
-                            <m:r>
-                              <a:rPr lang="en-US" sz="2000" b="0" i="1" dirty="0" smtClean="0">
-                                <a:solidFill>
-                                  <a:schemeClr val="tx1"/>
-                                </a:solidFill>
-                                <a:latin typeface="Cambria Math" panose="02040503050406030204" pitchFamily="18" charset="0"/>
-                              </a:rPr>
-                              <m:t>2</m:t>
-                            </m:r>
-                          </m:sup>
-                        </m:sSup>
-                        <m:r>
-                          <a:rPr lang="en-US" sz="2000" b="0" i="1" dirty="0" smtClean="0">
-                            <a:solidFill>
-                              <a:schemeClr val="tx1"/>
-                            </a:solidFill>
-                            <a:latin typeface="Cambria Math" panose="02040503050406030204" pitchFamily="18" charset="0"/>
-                          </a:rPr>
-                          <m:t>𝐾</m:t>
-                        </m:r>
-                      </m:den>
-                    </m:f>
-                  </m:oMath>
-                </a14:m>
-                <a:r>
-                  <a:rPr lang="en-US" sz="2000" b="0" dirty="0">
-                    <a:solidFill>
-                      <a:schemeClr val="tx1"/>
-                    </a:solidFill>
-                  </a:rPr>
-                  <a:t>?</a:t>
-                </a:r>
-              </a:p>
-            </p:txBody>
-          </p:sp>
-        </mc:Choice>
-        <mc:Fallback xmlns="">
-          <p:sp>
-            <p:nvSpPr>
-              <p:cNvPr id="2" name="Title 1"/>
-              <p:cNvSpPr>
-                <a:spLocks noGrp="1" noRot="1" noChangeAspect="1" noMove="1" noResize="1" noEditPoints="1" noAdjustHandles="1" noChangeArrowheads="1" noChangeShapeType="1" noTextEdit="1"/>
-              </p:cNvSpPr>
-              <p:nvPr>
-                <p:ph type="title"/>
-              </p:nvPr>
-            </p:nvSpPr>
-            <p:spPr>
-              <a:xfrm>
-                <a:off x="266700" y="427037"/>
-                <a:ext cx="8610600" cy="6153991"/>
-              </a:xfrm>
-              <a:blipFill>
-                <a:blip r:embed="rId2"/>
-                <a:stretch>
-                  <a:fillRect l="-2195" t="-1485" r="-1346"/>
-                </a:stretch>
-              </a:blipFill>
-            </p:spPr>
-            <p:txBody>
-              <a:bodyPr/>
-              <a:lstStyle/>
-              <a:p>
-                <a:r>
-                  <a:rPr lang="en-US">
-                    <a:noFill/>
-                  </a:rPr>
-                  <a:t> </a:t>
-                </a:r>
-              </a:p>
-            </p:txBody>
-          </p:sp>
-        </mc:Fallback>
-      </mc:AlternateContent>
-      <p:sp>
-        <p:nvSpPr>
-          <p:cNvPr id="4" name="Slide Number Placeholder 3"/>
-          <p:cNvSpPr>
-            <a:spLocks noGrp="1"/>
-          </p:cNvSpPr>
-          <p:nvPr>
-            <p:ph type="sldNum" sz="quarter" idx="12"/>
-          </p:nvPr>
-        </p:nvSpPr>
-        <p:spPr/>
-        <p:txBody>
-          <a:bodyPr/>
-          <a:lstStyle/>
-          <a:p>
-            <a:pPr>
-              <a:defRPr/>
-            </a:pPr>
-            <a:fld id="{E44E7CAD-5F39-408B-A599-8DF20FE1C985}" type="slidenum">
-              <a:rPr lang="en-US" smtClean="0"/>
-              <a:pPr>
-                <a:defRPr/>
-              </a:pPr>
-              <a:t>32</a:t>
-            </a:fld>
-            <a:endParaRPr lang="en-US"/>
-          </a:p>
-        </p:txBody>
-      </p:sp>
-      <p:sp>
-        <p:nvSpPr>
-          <p:cNvPr id="22" name="TextBox 21">
-            <a:extLst>
-              <a:ext uri="{FF2B5EF4-FFF2-40B4-BE49-F238E27FC236}">
-                <a16:creationId xmlns:a16="http://schemas.microsoft.com/office/drawing/2014/main" id="{41D5110A-8511-45F9-925E-80B4B4E2133E}"/>
-              </a:ext>
-            </a:extLst>
-          </p:cNvPr>
-          <p:cNvSpPr txBox="1"/>
-          <p:nvPr/>
-        </p:nvSpPr>
-        <p:spPr>
-          <a:xfrm>
-            <a:off x="3908998" y="5857605"/>
-            <a:ext cx="1326004" cy="369332"/>
-          </a:xfrm>
-          <a:prstGeom prst="rect">
-            <a:avLst/>
-          </a:prstGeom>
-          <a:noFill/>
-          <a:ln w="25400">
-            <a:solidFill>
-              <a:srgbClr val="FF0000"/>
-            </a:solidFill>
-          </a:ln>
-        </p:spPr>
-        <p:txBody>
-          <a:bodyPr wrap="none" rtlCol="0">
-            <a:spAutoFit/>
-          </a:bodyPr>
-          <a:lstStyle/>
-          <a:p>
-            <a:pPr algn="ctr"/>
-            <a:r>
-              <a:rPr lang="en-US" b="1" dirty="0">
-                <a:solidFill>
-                  <a:srgbClr val="FF0000"/>
-                </a:solidFill>
-                <a:hlinkClick r:id="rId3"/>
-              </a:rPr>
-              <a:t>Example 3</a:t>
-            </a:r>
-            <a:endParaRPr lang="en-US" b="1" dirty="0">
-              <a:solidFill>
-                <a:srgbClr val="FF0000"/>
-              </a:solidFill>
-            </a:endParaRPr>
-          </a:p>
-        </p:txBody>
-      </p:sp>
-    </p:spTree>
-    <p:extLst>
-      <p:ext uri="{BB962C8B-B14F-4D97-AF65-F5344CB8AC3E}">
-        <p14:creationId xmlns:p14="http://schemas.microsoft.com/office/powerpoint/2010/main" val="797931228"/>
-      </p:ext>
-    </p:extLst>
-  </p:cSld>
-  <p:clrMapOvr>
-    <a:masterClrMapping/>
-  </p:clrMapOvr>
-</p:sld>
-</file>
-
-<file path=ppt/slides/slide33.xml><?xml version="1.0" encoding="utf-8"?>
-<p:sld xmlns:a="http://schemas.openxmlformats.org/drawingml/2006/main" xmlns:r="http://schemas.openxmlformats.org/officeDocument/2006/relationships" xmlns:p="http://schemas.openxmlformats.org/presentationml/2006/main">
-  <p:cSld>
-    <p:spTree>
-      <p:nvGrpSpPr>
-        <p:cNvPr id="1" name=""/>
-        <p:cNvGrpSpPr/>
-        <p:nvPr/>
-      </p:nvGrpSpPr>
-      <p:grpSpPr>
-        <a:xfrm>
-          <a:off x="0" y="0"/>
-          <a:ext cx="0" cy="0"/>
-          <a:chOff x="0" y="0"/>
-          <a:chExt cx="0" cy="0"/>
-        </a:xfrm>
-      </p:grpSpPr>
       <p:sp>
         <p:nvSpPr>
           <p:cNvPr id="18435" name="Rectangle 2"/>
@@ -14009,7 +13396,7 @@
             <a:fld id="{5D10CE73-9D99-48D2-8C96-20A94CFD2B7D}" type="slidenum">
               <a:rPr lang="en-US" smtClean="0"/>
               <a:pPr/>
-              <a:t>33</a:t>
+              <a:t>32</a:t>
             </a:fld>
             <a:endParaRPr lang="en-US"/>
           </a:p>
@@ -14161,7 +13548,7 @@
 </p:sld>
 </file>
 
-<file path=ppt/slides/slide34.xml><?xml version="1.0" encoding="utf-8"?>
+<file path=ppt/slides/slide33.xml><?xml version="1.0" encoding="utf-8"?>
 <p:sld xmlns:a="http://schemas.openxmlformats.org/drawingml/2006/main" xmlns:r="http://schemas.openxmlformats.org/officeDocument/2006/relationships" xmlns:p="http://schemas.openxmlformats.org/presentationml/2006/main">
   <p:cSld>
     <p:spTree>
@@ -14401,7 +13788,7 @@
             <a:fld id="{B7A0916F-9E72-4D9B-A274-642B9350B419}" type="slidenum">
               <a:rPr lang="en-US" smtClean="0"/>
               <a:pPr/>
-              <a:t>34</a:t>
+              <a:t>33</a:t>
             </a:fld>
             <a:endParaRPr lang="en-US"/>
           </a:p>
@@ -14637,7 +14024,7 @@
 </p:sld>
 </file>
 
-<file path=ppt/slides/slide35.xml><?xml version="1.0" encoding="utf-8"?>
+<file path=ppt/slides/slide34.xml><?xml version="1.0" encoding="utf-8"?>
 <p:sld xmlns:a="http://schemas.openxmlformats.org/drawingml/2006/main" xmlns:r="http://schemas.openxmlformats.org/officeDocument/2006/relationships" xmlns:p="http://schemas.openxmlformats.org/presentationml/2006/main">
   <p:cSld>
     <p:spTree>
@@ -14702,7 +14089,7 @@
             <a:fld id="{151CF030-00AC-44E6-BF2D-4BD9F03F9F5B}" type="slidenum">
               <a:rPr lang="en-US" smtClean="0"/>
               <a:pPr/>
-              <a:t>35</a:t>
+              <a:t>34</a:t>
             </a:fld>
             <a:endParaRPr lang="en-US"/>
           </a:p>
@@ -15044,7 +14431,7 @@
 </p:sld>
 </file>
 
-<file path=ppt/slides/slide36.xml><?xml version="1.0" encoding="utf-8"?>
+<file path=ppt/slides/slide35.xml><?xml version="1.0" encoding="utf-8"?>
 <p:sld xmlns:a="http://schemas.openxmlformats.org/drawingml/2006/main" xmlns:r="http://schemas.openxmlformats.org/officeDocument/2006/relationships" xmlns:p="http://schemas.openxmlformats.org/presentationml/2006/main">
   <p:cSld>
     <p:spTree>
@@ -15254,7 +14641,7 @@
             <a:fld id="{DCF07C35-E2CA-4A80-9F7E-9ED0905316A7}" type="slidenum">
               <a:rPr lang="en-US" smtClean="0"/>
               <a:pPr/>
-              <a:t>36</a:t>
+              <a:t>35</a:t>
             </a:fld>
             <a:endParaRPr lang="en-US"/>
           </a:p>
@@ -15563,7 +14950,7 @@
 </p:sld>
 </file>
 
-<file path=ppt/slides/slide37.xml><?xml version="1.0" encoding="utf-8"?>
+<file path=ppt/slides/slide36.xml><?xml version="1.0" encoding="utf-8"?>
 <p:sld xmlns:a="http://schemas.openxmlformats.org/drawingml/2006/main" xmlns:r="http://schemas.openxmlformats.org/officeDocument/2006/relationships" xmlns:p="http://schemas.openxmlformats.org/presentationml/2006/main">
   <p:cSld>
     <p:spTree>
@@ -15628,7 +15015,7 @@
             <a:fld id="{3BEE7FD7-88B4-4937-990D-26F8F65B5334}" type="slidenum">
               <a:rPr lang="en-US" smtClean="0"/>
               <a:pPr/>
-              <a:t>37</a:t>
+              <a:t>36</a:t>
             </a:fld>
             <a:endParaRPr lang="en-US"/>
           </a:p>
@@ -16047,7 +15434,7 @@
 </p:sld>
 </file>
 
-<file path=ppt/slides/slide38.xml><?xml version="1.0" encoding="utf-8"?>
+<file path=ppt/slides/slide37.xml><?xml version="1.0" encoding="utf-8"?>
 <p:sld xmlns:a="http://schemas.openxmlformats.org/drawingml/2006/main" xmlns:r="http://schemas.openxmlformats.org/officeDocument/2006/relationships" xmlns:p="http://schemas.openxmlformats.org/presentationml/2006/main">
   <p:cSld>
     <p:spTree>
@@ -16112,7 +15499,7 @@
             <a:fld id="{DF5C6A74-B255-4144-9B67-60CBCD7D7B8F}" type="slidenum">
               <a:rPr lang="en-US" smtClean="0"/>
               <a:pPr/>
-              <a:t>38</a:t>
+              <a:t>37</a:t>
             </a:fld>
             <a:endParaRPr lang="en-US"/>
           </a:p>
@@ -16553,7 +15940,7 @@
 </p:sld>
 </file>
 
-<file path=ppt/slides/slide39.xml><?xml version="1.0" encoding="utf-8"?>
+<file path=ppt/slides/slide38.xml><?xml version="1.0" encoding="utf-8"?>
 <p:sld xmlns:a="http://schemas.openxmlformats.org/drawingml/2006/main" xmlns:r="http://schemas.openxmlformats.org/officeDocument/2006/relationships" xmlns:p="http://schemas.openxmlformats.org/presentationml/2006/main">
   <p:cSld>
     <p:spTree>
@@ -16671,7 +16058,7 @@
               <a:pPr>
                 <a:defRPr/>
               </a:pPr>
-              <a:t>39</a:t>
+              <a:t>38</a:t>
             </a:fld>
             <a:endParaRPr lang="en-US"/>
           </a:p>
@@ -16691,8 +16078,8 @@
         </p:nvSpPr>
         <p:spPr>
           <a:xfrm>
-            <a:off x="3908998" y="3300955"/>
-            <a:ext cx="1326004" cy="369332"/>
+            <a:off x="3921823" y="3300955"/>
+            <a:ext cx="1300356" cy="369332"/>
           </a:xfrm>
           <a:prstGeom prst="rect">
             <a:avLst/>
@@ -16718,7 +16105,7 @@
                 </a:solidFill>
                 <a:hlinkClick r:id="rId2"/>
               </a:rPr>
-              <a:t>Example 4</a:t>
+              <a:t>Solution 4</a:t>
             </a:r>
             <a:endParaRPr lang="en-US" b="1" dirty="0">
               <a:solidFill>
@@ -16734,6 +16121,254 @@
         <p14:creationId xmlns:p14="http://schemas.microsoft.com/office/powerpoint/2010/main" val="3122169637"/>
       </p:ext>
     </p:extLst>
+  </p:cSld>
+  <p:clrMapOvr>
+    <a:masterClrMapping/>
+  </p:clrMapOvr>
+</p:sld>
+</file>
+
+<file path=ppt/slides/slide39.xml><?xml version="1.0" encoding="utf-8"?>
+<p:sld xmlns:a="http://schemas.openxmlformats.org/drawingml/2006/main" xmlns:r="http://schemas.openxmlformats.org/officeDocument/2006/relationships" xmlns:p="http://schemas.openxmlformats.org/presentationml/2006/main">
+  <p:cSld>
+    <p:spTree>
+      <p:nvGrpSpPr>
+        <p:cNvPr id="1" name=""/>
+        <p:cNvGrpSpPr/>
+        <p:nvPr/>
+      </p:nvGrpSpPr>
+      <p:grpSpPr>
+        <a:xfrm>
+          <a:off x="0" y="0"/>
+          <a:ext cx="0" cy="0"/>
+          <a:chOff x="0" y="0"/>
+          <a:chExt cx="0" cy="0"/>
+        </a:xfrm>
+      </p:grpSpPr>
+      <p:sp>
+        <p:nvSpPr>
+          <p:cNvPr id="24579" name="Rectangle 2"/>
+          <p:cNvSpPr>
+            <a:spLocks noGrp="1" noChangeArrowheads="1"/>
+          </p:cNvSpPr>
+          <p:nvPr>
+            <p:ph type="title"/>
+          </p:nvPr>
+        </p:nvSpPr>
+        <p:spPr>
+          <a:xfrm>
+            <a:off x="228600" y="1447800"/>
+            <a:ext cx="4419600" cy="381000"/>
+          </a:xfrm>
+        </p:spPr>
+        <p:txBody>
+          <a:bodyPr/>
+          <a:lstStyle/>
+          <a:p>
+            <a:pPr eaLnBrk="1" hangingPunct="1"/>
+            <a:r>
+              <a:rPr lang="en-US" sz="2000"/>
+              <a:t>Work Done on Elastic Solid Bars</a:t>
+            </a:r>
+            <a:endParaRPr lang="en-US" sz="2000" b="0"/>
+          </a:p>
+        </p:txBody>
+      </p:sp>
+      <p:sp>
+        <p:nvSpPr>
+          <p:cNvPr id="24578" name="5 Slayt Numarası Yer Tutucusu"/>
+          <p:cNvSpPr>
+            <a:spLocks noGrp="1"/>
+          </p:cNvSpPr>
+          <p:nvPr>
+            <p:ph type="sldNum" sz="quarter" idx="12"/>
+          </p:nvPr>
+        </p:nvSpPr>
+        <p:spPr>
+          <a:noFill/>
+        </p:spPr>
+        <p:txBody>
+          <a:bodyPr/>
+          <a:lstStyle/>
+          <a:p>
+            <a:fld id="{73D7746E-0774-4BE3-8D88-7EF42D0E1CDA}" type="slidenum">
+              <a:rPr lang="en-US" smtClean="0"/>
+              <a:pPr/>
+              <a:t>39</a:t>
+            </a:fld>
+            <a:endParaRPr lang="en-US"/>
+          </a:p>
+        </p:txBody>
+      </p:sp>
+      <p:pic>
+        <p:nvPicPr>
+          <p:cNvPr id="24580" name="Picture 9"/>
+          <p:cNvPicPr>
+            <a:picLocks noChangeAspect="1" noChangeArrowheads="1"/>
+          </p:cNvPicPr>
+          <p:nvPr/>
+        </p:nvPicPr>
+        <p:blipFill>
+          <a:blip r:embed="rId2"/>
+          <a:srcRect/>
+          <a:stretch>
+            <a:fillRect/>
+          </a:stretch>
+        </p:blipFill>
+        <p:spPr bwMode="auto">
+          <a:xfrm>
+            <a:off x="152400" y="1905000"/>
+            <a:ext cx="4930775" cy="931863"/>
+          </a:xfrm>
+          <a:prstGeom prst="rect">
+            <a:avLst/>
+          </a:prstGeom>
+          <a:noFill/>
+          <a:ln w="9525">
+            <a:noFill/>
+            <a:miter lim="800000"/>
+            <a:headEnd/>
+            <a:tailEnd/>
+          </a:ln>
+        </p:spPr>
+      </p:pic>
+      <p:pic>
+        <p:nvPicPr>
+          <p:cNvPr id="24581" name="Picture 10"/>
+          <p:cNvPicPr>
+            <a:picLocks noChangeAspect="1" noChangeArrowheads="1"/>
+          </p:cNvPicPr>
+          <p:nvPr/>
+        </p:nvPicPr>
+        <p:blipFill>
+          <a:blip r:embed="rId3"/>
+          <a:srcRect/>
+          <a:stretch>
+            <a:fillRect/>
+          </a:stretch>
+        </p:blipFill>
+        <p:spPr bwMode="auto">
+          <a:xfrm>
+            <a:off x="5486400" y="304800"/>
+            <a:ext cx="3425825" cy="869950"/>
+          </a:xfrm>
+          <a:prstGeom prst="rect">
+            <a:avLst/>
+          </a:prstGeom>
+          <a:noFill/>
+          <a:ln w="9525">
+            <a:noFill/>
+            <a:miter lim="800000"/>
+            <a:headEnd/>
+            <a:tailEnd/>
+          </a:ln>
+        </p:spPr>
+      </p:pic>
+      <p:sp>
+        <p:nvSpPr>
+          <p:cNvPr id="24582" name="Rectangle 11"/>
+          <p:cNvSpPr>
+            <a:spLocks noChangeArrowheads="1"/>
+          </p:cNvSpPr>
+          <p:nvPr/>
+        </p:nvSpPr>
+        <p:spPr bwMode="auto">
+          <a:xfrm>
+            <a:off x="2286000" y="457200"/>
+            <a:ext cx="3124200" cy="685800"/>
+          </a:xfrm>
+          <a:prstGeom prst="rect">
+            <a:avLst/>
+          </a:prstGeom>
+          <a:noFill/>
+          <a:ln w="9525">
+            <a:noFill/>
+            <a:miter lim="800000"/>
+            <a:headEnd/>
+            <a:tailEnd/>
+          </a:ln>
+        </p:spPr>
+        <p:txBody>
+          <a:bodyPr anchor="ctr"/>
+          <a:lstStyle/>
+          <a:p>
+            <a:pPr algn="r"/>
+            <a:r>
+              <a:rPr lang="en-US" sz="2000" b="1">
+                <a:solidFill>
+                  <a:srgbClr val="FF0000"/>
+                </a:solidFill>
+              </a:rPr>
+              <a:t>Work Associated with the Stretching of a Liquid Film</a:t>
+            </a:r>
+          </a:p>
+        </p:txBody>
+      </p:sp>
+      <p:pic>
+        <p:nvPicPr>
+          <p:cNvPr id="24583" name="Picture 9"/>
+          <p:cNvPicPr>
+            <a:picLocks noChangeAspect="1" noChangeArrowheads="1"/>
+          </p:cNvPicPr>
+          <p:nvPr/>
+        </p:nvPicPr>
+        <p:blipFill>
+          <a:blip r:embed="rId4"/>
+          <a:srcRect/>
+          <a:stretch>
+            <a:fillRect/>
+          </a:stretch>
+        </p:blipFill>
+        <p:spPr bwMode="auto">
+          <a:xfrm>
+            <a:off x="333375" y="2971800"/>
+            <a:ext cx="3857625" cy="3749675"/>
+          </a:xfrm>
+          <a:prstGeom prst="rect">
+            <a:avLst/>
+          </a:prstGeom>
+          <a:noFill/>
+          <a:ln w="9525">
+            <a:noFill/>
+            <a:miter lim="800000"/>
+            <a:headEnd/>
+            <a:tailEnd/>
+          </a:ln>
+        </p:spPr>
+      </p:pic>
+      <p:pic>
+        <p:nvPicPr>
+          <p:cNvPr id="24584" name="Picture 10"/>
+          <p:cNvPicPr>
+            <a:picLocks noChangeAspect="1" noChangeArrowheads="1"/>
+          </p:cNvPicPr>
+          <p:nvPr/>
+        </p:nvPicPr>
+        <p:blipFill>
+          <a:blip r:embed="rId5"/>
+          <a:srcRect/>
+          <a:stretch>
+            <a:fillRect/>
+          </a:stretch>
+        </p:blipFill>
+        <p:spPr bwMode="auto">
+          <a:xfrm>
+            <a:off x="5143500" y="1295400"/>
+            <a:ext cx="3848100" cy="5419725"/>
+          </a:xfrm>
+          <a:prstGeom prst="rect">
+            <a:avLst/>
+          </a:prstGeom>
+          <a:noFill/>
+          <a:ln w="9525">
+            <a:noFill/>
+            <a:miter lim="800000"/>
+            <a:headEnd/>
+            <a:tailEnd/>
+          </a:ln>
+        </p:spPr>
+      </p:pic>
+    </p:spTree>
   </p:cSld>
   <p:clrMapOvr>
     <a:masterClrMapping/>
@@ -16907,254 +16542,6 @@
       </p:grpSpPr>
       <p:sp>
         <p:nvSpPr>
-          <p:cNvPr id="24579" name="Rectangle 2"/>
-          <p:cNvSpPr>
-            <a:spLocks noGrp="1" noChangeArrowheads="1"/>
-          </p:cNvSpPr>
-          <p:nvPr>
-            <p:ph type="title"/>
-          </p:nvPr>
-        </p:nvSpPr>
-        <p:spPr>
-          <a:xfrm>
-            <a:off x="228600" y="1447800"/>
-            <a:ext cx="4419600" cy="381000"/>
-          </a:xfrm>
-        </p:spPr>
-        <p:txBody>
-          <a:bodyPr/>
-          <a:lstStyle/>
-          <a:p>
-            <a:pPr eaLnBrk="1" hangingPunct="1"/>
-            <a:r>
-              <a:rPr lang="en-US" sz="2000"/>
-              <a:t>Work Done on Elastic Solid Bars</a:t>
-            </a:r>
-            <a:endParaRPr lang="en-US" sz="2000" b="0"/>
-          </a:p>
-        </p:txBody>
-      </p:sp>
-      <p:sp>
-        <p:nvSpPr>
-          <p:cNvPr id="24578" name="5 Slayt Numarası Yer Tutucusu"/>
-          <p:cNvSpPr>
-            <a:spLocks noGrp="1"/>
-          </p:cNvSpPr>
-          <p:nvPr>
-            <p:ph type="sldNum" sz="quarter" idx="12"/>
-          </p:nvPr>
-        </p:nvSpPr>
-        <p:spPr>
-          <a:noFill/>
-        </p:spPr>
-        <p:txBody>
-          <a:bodyPr/>
-          <a:lstStyle/>
-          <a:p>
-            <a:fld id="{73D7746E-0774-4BE3-8D88-7EF42D0E1CDA}" type="slidenum">
-              <a:rPr lang="en-US" smtClean="0"/>
-              <a:pPr/>
-              <a:t>40</a:t>
-            </a:fld>
-            <a:endParaRPr lang="en-US"/>
-          </a:p>
-        </p:txBody>
-      </p:sp>
-      <p:pic>
-        <p:nvPicPr>
-          <p:cNvPr id="24580" name="Picture 9"/>
-          <p:cNvPicPr>
-            <a:picLocks noChangeAspect="1" noChangeArrowheads="1"/>
-          </p:cNvPicPr>
-          <p:nvPr/>
-        </p:nvPicPr>
-        <p:blipFill>
-          <a:blip r:embed="rId2"/>
-          <a:srcRect/>
-          <a:stretch>
-            <a:fillRect/>
-          </a:stretch>
-        </p:blipFill>
-        <p:spPr bwMode="auto">
-          <a:xfrm>
-            <a:off x="152400" y="1905000"/>
-            <a:ext cx="4930775" cy="931863"/>
-          </a:xfrm>
-          <a:prstGeom prst="rect">
-            <a:avLst/>
-          </a:prstGeom>
-          <a:noFill/>
-          <a:ln w="9525">
-            <a:noFill/>
-            <a:miter lim="800000"/>
-            <a:headEnd/>
-            <a:tailEnd/>
-          </a:ln>
-        </p:spPr>
-      </p:pic>
-      <p:pic>
-        <p:nvPicPr>
-          <p:cNvPr id="24581" name="Picture 10"/>
-          <p:cNvPicPr>
-            <a:picLocks noChangeAspect="1" noChangeArrowheads="1"/>
-          </p:cNvPicPr>
-          <p:nvPr/>
-        </p:nvPicPr>
-        <p:blipFill>
-          <a:blip r:embed="rId3"/>
-          <a:srcRect/>
-          <a:stretch>
-            <a:fillRect/>
-          </a:stretch>
-        </p:blipFill>
-        <p:spPr bwMode="auto">
-          <a:xfrm>
-            <a:off x="5486400" y="304800"/>
-            <a:ext cx="3425825" cy="869950"/>
-          </a:xfrm>
-          <a:prstGeom prst="rect">
-            <a:avLst/>
-          </a:prstGeom>
-          <a:noFill/>
-          <a:ln w="9525">
-            <a:noFill/>
-            <a:miter lim="800000"/>
-            <a:headEnd/>
-            <a:tailEnd/>
-          </a:ln>
-        </p:spPr>
-      </p:pic>
-      <p:sp>
-        <p:nvSpPr>
-          <p:cNvPr id="24582" name="Rectangle 11"/>
-          <p:cNvSpPr>
-            <a:spLocks noChangeArrowheads="1"/>
-          </p:cNvSpPr>
-          <p:nvPr/>
-        </p:nvSpPr>
-        <p:spPr bwMode="auto">
-          <a:xfrm>
-            <a:off x="2286000" y="457200"/>
-            <a:ext cx="3124200" cy="685800"/>
-          </a:xfrm>
-          <a:prstGeom prst="rect">
-            <a:avLst/>
-          </a:prstGeom>
-          <a:noFill/>
-          <a:ln w="9525">
-            <a:noFill/>
-            <a:miter lim="800000"/>
-            <a:headEnd/>
-            <a:tailEnd/>
-          </a:ln>
-        </p:spPr>
-        <p:txBody>
-          <a:bodyPr anchor="ctr"/>
-          <a:lstStyle/>
-          <a:p>
-            <a:pPr algn="r"/>
-            <a:r>
-              <a:rPr lang="en-US" sz="2000" b="1">
-                <a:solidFill>
-                  <a:srgbClr val="FF0000"/>
-                </a:solidFill>
-              </a:rPr>
-              <a:t>Work Associated with the Stretching of a Liquid Film</a:t>
-            </a:r>
-          </a:p>
-        </p:txBody>
-      </p:sp>
-      <p:pic>
-        <p:nvPicPr>
-          <p:cNvPr id="24583" name="Picture 9"/>
-          <p:cNvPicPr>
-            <a:picLocks noChangeAspect="1" noChangeArrowheads="1"/>
-          </p:cNvPicPr>
-          <p:nvPr/>
-        </p:nvPicPr>
-        <p:blipFill>
-          <a:blip r:embed="rId4"/>
-          <a:srcRect/>
-          <a:stretch>
-            <a:fillRect/>
-          </a:stretch>
-        </p:blipFill>
-        <p:spPr bwMode="auto">
-          <a:xfrm>
-            <a:off x="333375" y="2971800"/>
-            <a:ext cx="3857625" cy="3749675"/>
-          </a:xfrm>
-          <a:prstGeom prst="rect">
-            <a:avLst/>
-          </a:prstGeom>
-          <a:noFill/>
-          <a:ln w="9525">
-            <a:noFill/>
-            <a:miter lim="800000"/>
-            <a:headEnd/>
-            <a:tailEnd/>
-          </a:ln>
-        </p:spPr>
-      </p:pic>
-      <p:pic>
-        <p:nvPicPr>
-          <p:cNvPr id="24584" name="Picture 10"/>
-          <p:cNvPicPr>
-            <a:picLocks noChangeAspect="1" noChangeArrowheads="1"/>
-          </p:cNvPicPr>
-          <p:nvPr/>
-        </p:nvPicPr>
-        <p:blipFill>
-          <a:blip r:embed="rId5"/>
-          <a:srcRect/>
-          <a:stretch>
-            <a:fillRect/>
-          </a:stretch>
-        </p:blipFill>
-        <p:spPr bwMode="auto">
-          <a:xfrm>
-            <a:off x="5143500" y="1295400"/>
-            <a:ext cx="3848100" cy="5419725"/>
-          </a:xfrm>
-          <a:prstGeom prst="rect">
-            <a:avLst/>
-          </a:prstGeom>
-          <a:noFill/>
-          <a:ln w="9525">
-            <a:noFill/>
-            <a:miter lim="800000"/>
-            <a:headEnd/>
-            <a:tailEnd/>
-          </a:ln>
-        </p:spPr>
-      </p:pic>
-    </p:spTree>
-  </p:cSld>
-  <p:clrMapOvr>
-    <a:masterClrMapping/>
-  </p:clrMapOvr>
-</p:sld>
-</file>
-
-<file path=ppt/slides/slide41.xml><?xml version="1.0" encoding="utf-8"?>
-<p:sld xmlns:a="http://schemas.openxmlformats.org/drawingml/2006/main" xmlns:r="http://schemas.openxmlformats.org/officeDocument/2006/relationships" xmlns:p="http://schemas.openxmlformats.org/presentationml/2006/main">
-  <p:cSld>
-    <p:spTree>
-      <p:nvGrpSpPr>
-        <p:cNvPr id="1" name=""/>
-        <p:cNvGrpSpPr/>
-        <p:nvPr/>
-      </p:nvGrpSpPr>
-      <p:grpSpPr>
-        <a:xfrm>
-          <a:off x="0" y="0"/>
-          <a:ext cx="0" cy="0"/>
-          <a:chOff x="0" y="0"/>
-          <a:chExt cx="0" cy="0"/>
-        </a:xfrm>
-      </p:grpSpPr>
-      <p:sp>
-        <p:nvSpPr>
           <p:cNvPr id="25603" name="Rectangle 2"/>
           <p:cNvSpPr>
             <a:spLocks noGrp="1" noChangeArrowheads="1"/>
@@ -17202,7 +16589,7 @@
             <a:fld id="{D0A1EABC-7365-4E4B-A212-0462CD19547C}" type="slidenum">
               <a:rPr lang="en-US" smtClean="0"/>
               <a:pPr/>
-              <a:t>41</a:t>
+              <a:t>40</a:t>
             </a:fld>
             <a:endParaRPr lang="en-US"/>
           </a:p>
@@ -17589,7 +16976,7 @@
 </p:sld>
 </file>
 
-<file path=ppt/slides/slide42.xml><?xml version="1.0" encoding="utf-8"?>
+<file path=ppt/slides/slide41.xml><?xml version="1.0" encoding="utf-8"?>
 <p:sld xmlns:a="http://schemas.openxmlformats.org/drawingml/2006/main" xmlns:r="http://schemas.openxmlformats.org/officeDocument/2006/relationships" xmlns:p="http://schemas.openxmlformats.org/presentationml/2006/main">
   <p:cSld>
     <p:spTree>
@@ -17867,7 +17254,7 @@
             <a:fld id="{CAA4D160-B367-4DC2-BAFC-A61D9495AB69}" type="slidenum">
               <a:rPr lang="en-US" smtClean="0"/>
               <a:pPr/>
-              <a:t>42</a:t>
+              <a:t>41</a:t>
             </a:fld>
             <a:endParaRPr lang="en-US"/>
           </a:p>

</xml_diff>